<commit_message>
Updated program to loop and run overnight
</commit_message>
<xml_diff>
--- a/hw02/p2output.pptx
+++ b/hw02/p2output.pptx
@@ -6,6 +6,7 @@
   </p:sldMasterIdLst>
   <p:sldIdLst>
     <p:sldId id="256" r:id="rId2"/>
+    <p:sldId id="257" r:id="rId3"/>
   </p:sldIdLst>
   <p:sldSz cx="12192000" cy="6858000"/>
   <p:notesSz cx="6858000" cy="9144000"/>
@@ -104,6 +105,11 @@
       </a:defRPr>
     </a:lvl9pPr>
   </p:defaultTextStyle>
+  <p:extLst>
+    <p:ext uri="{EFAFB233-063F-42B5-8137-9DF3F51BA10A}">
+      <p15:sldGuideLst xmlns:p15="http://schemas.microsoft.com/office/powerpoint/2012/main"/>
+    </p:ext>
+  </p:extLst>
 </p:presentation>
 </file>
 
@@ -187,7 +193,7 @@
           <c:order val="0"/>
           <c:tx>
             <c:strRef>
-              <c:f>faces!$A$1</c:f>
+              <c:f>faces!$B$1</c:f>
               <c:strCache>
                 <c:ptCount val="1"/>
                 <c:pt idx="0">
@@ -208,13 +214,49 @@
           <c:marker>
             <c:symbol val="none"/>
           </c:marker>
-          <c:val>
+          <c:cat>
             <c:numRef>
               <c:f>faces!$A$2:$A$10</c:f>
               <c:numCache>
                 <c:formatCode>General</c:formatCode>
                 <c:ptCount val="9"/>
                 <c:pt idx="0">
+                  <c:v>2</c:v>
+                </c:pt>
+                <c:pt idx="1">
+                  <c:v>3</c:v>
+                </c:pt>
+                <c:pt idx="2">
+                  <c:v>4</c:v>
+                </c:pt>
+                <c:pt idx="3">
+                  <c:v>5</c:v>
+                </c:pt>
+                <c:pt idx="4">
+                  <c:v>6</c:v>
+                </c:pt>
+                <c:pt idx="5">
+                  <c:v>7</c:v>
+                </c:pt>
+                <c:pt idx="6">
+                  <c:v>8</c:v>
+                </c:pt>
+                <c:pt idx="7">
+                  <c:v>9</c:v>
+                </c:pt>
+                <c:pt idx="8">
+                  <c:v>10</c:v>
+                </c:pt>
+              </c:numCache>
+            </c:numRef>
+          </c:cat>
+          <c:val>
+            <c:numRef>
+              <c:f>faces!$B$2:$B$10</c:f>
+              <c:numCache>
+                <c:formatCode>General</c:formatCode>
+                <c:ptCount val="9"/>
+                <c:pt idx="0">
                   <c:v>0.80249999999999999</c:v>
                 </c:pt>
                 <c:pt idx="1">
@@ -247,7 +289,7 @@
           <c:smooth val="0"/>
           <c:extLst>
             <c:ext xmlns:c16="http://schemas.microsoft.com/office/drawing/2014/chart" uri="{C3380CC4-5D6E-409C-BE32-E72D297353CC}">
-              <c16:uniqueId val="{00000000-D925-452F-9839-0A3C652632B1}"/>
+              <c16:uniqueId val="{00000000-0DEB-4E01-BD0F-B9BFC5DAF932}"/>
             </c:ext>
           </c:extLst>
         </c:ser>
@@ -256,7 +298,7 @@
           <c:order val="1"/>
           <c:tx>
             <c:strRef>
-              <c:f>faces!$B$1</c:f>
+              <c:f>faces!$C$1</c:f>
               <c:strCache>
                 <c:ptCount val="1"/>
                 <c:pt idx="0">
@@ -277,9 +319,45 @@
           <c:marker>
             <c:symbol val="none"/>
           </c:marker>
+          <c:cat>
+            <c:numRef>
+              <c:f>faces!$A$2:$A$10</c:f>
+              <c:numCache>
+                <c:formatCode>General</c:formatCode>
+                <c:ptCount val="9"/>
+                <c:pt idx="0">
+                  <c:v>2</c:v>
+                </c:pt>
+                <c:pt idx="1">
+                  <c:v>3</c:v>
+                </c:pt>
+                <c:pt idx="2">
+                  <c:v>4</c:v>
+                </c:pt>
+                <c:pt idx="3">
+                  <c:v>5</c:v>
+                </c:pt>
+                <c:pt idx="4">
+                  <c:v>6</c:v>
+                </c:pt>
+                <c:pt idx="5">
+                  <c:v>7</c:v>
+                </c:pt>
+                <c:pt idx="6">
+                  <c:v>8</c:v>
+                </c:pt>
+                <c:pt idx="7">
+                  <c:v>9</c:v>
+                </c:pt>
+                <c:pt idx="8">
+                  <c:v>10</c:v>
+                </c:pt>
+              </c:numCache>
+            </c:numRef>
+          </c:cat>
           <c:val>
             <c:numRef>
-              <c:f>faces!$B$2:$B$10</c:f>
+              <c:f>faces!$C$2:$C$10</c:f>
               <c:numCache>
                 <c:formatCode>General</c:formatCode>
                 <c:ptCount val="9"/>
@@ -316,7 +394,7 @@
           <c:smooth val="0"/>
           <c:extLst>
             <c:ext xmlns:c16="http://schemas.microsoft.com/office/drawing/2014/chart" uri="{C3380CC4-5D6E-409C-BE32-E72D297353CC}">
-              <c16:uniqueId val="{00000001-D925-452F-9839-0A3C652632B1}"/>
+              <c16:uniqueId val="{00000001-0DEB-4E01-BD0F-B9BFC5DAF932}"/>
             </c:ext>
           </c:extLst>
         </c:ser>
@@ -325,7 +403,7 @@
           <c:order val="2"/>
           <c:tx>
             <c:strRef>
-              <c:f>faces!$C$1</c:f>
+              <c:f>faces!$D$1</c:f>
               <c:strCache>
                 <c:ptCount val="1"/>
                 <c:pt idx="0">
@@ -346,9 +424,45 @@
           <c:marker>
             <c:symbol val="none"/>
           </c:marker>
+          <c:cat>
+            <c:numRef>
+              <c:f>faces!$A$2:$A$10</c:f>
+              <c:numCache>
+                <c:formatCode>General</c:formatCode>
+                <c:ptCount val="9"/>
+                <c:pt idx="0">
+                  <c:v>2</c:v>
+                </c:pt>
+                <c:pt idx="1">
+                  <c:v>3</c:v>
+                </c:pt>
+                <c:pt idx="2">
+                  <c:v>4</c:v>
+                </c:pt>
+                <c:pt idx="3">
+                  <c:v>5</c:v>
+                </c:pt>
+                <c:pt idx="4">
+                  <c:v>6</c:v>
+                </c:pt>
+                <c:pt idx="5">
+                  <c:v>7</c:v>
+                </c:pt>
+                <c:pt idx="6">
+                  <c:v>8</c:v>
+                </c:pt>
+                <c:pt idx="7">
+                  <c:v>9</c:v>
+                </c:pt>
+                <c:pt idx="8">
+                  <c:v>10</c:v>
+                </c:pt>
+              </c:numCache>
+            </c:numRef>
+          </c:cat>
           <c:val>
             <c:numRef>
-              <c:f>faces!$C$2:$C$10</c:f>
+              <c:f>faces!$D$2:$D$10</c:f>
               <c:numCache>
                 <c:formatCode>General</c:formatCode>
                 <c:ptCount val="9"/>
@@ -385,7 +499,7 @@
           <c:smooth val="0"/>
           <c:extLst>
             <c:ext xmlns:c16="http://schemas.microsoft.com/office/drawing/2014/chart" uri="{C3380CC4-5D6E-409C-BE32-E72D297353CC}">
-              <c16:uniqueId val="{00000002-D925-452F-9839-0A3C652632B1}"/>
+              <c16:uniqueId val="{00000002-0DEB-4E01-BD0F-B9BFC5DAF932}"/>
             </c:ext>
           </c:extLst>
         </c:ser>
@@ -394,7 +508,7 @@
           <c:order val="3"/>
           <c:tx>
             <c:strRef>
-              <c:f>faces!$D$1</c:f>
+              <c:f>faces!$E$1</c:f>
               <c:strCache>
                 <c:ptCount val="1"/>
                 <c:pt idx="0">
@@ -415,9 +529,45 @@
           <c:marker>
             <c:symbol val="none"/>
           </c:marker>
+          <c:cat>
+            <c:numRef>
+              <c:f>faces!$A$2:$A$10</c:f>
+              <c:numCache>
+                <c:formatCode>General</c:formatCode>
+                <c:ptCount val="9"/>
+                <c:pt idx="0">
+                  <c:v>2</c:v>
+                </c:pt>
+                <c:pt idx="1">
+                  <c:v>3</c:v>
+                </c:pt>
+                <c:pt idx="2">
+                  <c:v>4</c:v>
+                </c:pt>
+                <c:pt idx="3">
+                  <c:v>5</c:v>
+                </c:pt>
+                <c:pt idx="4">
+                  <c:v>6</c:v>
+                </c:pt>
+                <c:pt idx="5">
+                  <c:v>7</c:v>
+                </c:pt>
+                <c:pt idx="6">
+                  <c:v>8</c:v>
+                </c:pt>
+                <c:pt idx="7">
+                  <c:v>9</c:v>
+                </c:pt>
+                <c:pt idx="8">
+                  <c:v>10</c:v>
+                </c:pt>
+              </c:numCache>
+            </c:numRef>
+          </c:cat>
           <c:val>
             <c:numRef>
-              <c:f>faces!$D$2:$D$10</c:f>
+              <c:f>faces!$E$2:$E$10</c:f>
               <c:numCache>
                 <c:formatCode>General</c:formatCode>
                 <c:ptCount val="9"/>
@@ -454,7 +604,7 @@
           <c:smooth val="0"/>
           <c:extLst>
             <c:ext xmlns:c16="http://schemas.microsoft.com/office/drawing/2014/chart" uri="{C3380CC4-5D6E-409C-BE32-E72D297353CC}">
-              <c16:uniqueId val="{00000003-D925-452F-9839-0A3C652632B1}"/>
+              <c16:uniqueId val="{00000003-0DEB-4E01-BD0F-B9BFC5DAF932}"/>
             </c:ext>
           </c:extLst>
         </c:ser>
@@ -467,11 +617,11 @@
           <c:showBubbleSize val="0"/>
         </c:dLbls>
         <c:smooth val="0"/>
-        <c:axId val="337149416"/>
-        <c:axId val="337149744"/>
+        <c:axId val="372746568"/>
+        <c:axId val="372746896"/>
       </c:lineChart>
       <c:catAx>
-        <c:axId val="337149416"/>
+        <c:axId val="372746568"/>
         <c:scaling>
           <c:orientation val="minMax"/>
         </c:scaling>
@@ -514,7 +664,7 @@
             <a:endParaRPr lang="en-US"/>
           </a:p>
         </c:txPr>
-        <c:crossAx val="337149744"/>
+        <c:crossAx val="372746896"/>
         <c:crosses val="autoZero"/>
         <c:auto val="1"/>
         <c:lblAlgn val="ctr"/>
@@ -522,7 +672,7 @@
         <c:noMultiLvlLbl val="0"/>
       </c:catAx>
       <c:valAx>
-        <c:axId val="337149744"/>
+        <c:axId val="372746896"/>
         <c:scaling>
           <c:orientation val="minMax"/>
         </c:scaling>
@@ -573,7 +723,7 @@
             <a:endParaRPr lang="en-US"/>
           </a:p>
         </c:txPr>
-        <c:crossAx val="337149416"/>
+        <c:crossAx val="372746568"/>
         <c:crosses val="autoZero"/>
         <c:crossBetween val="between"/>
       </c:valAx>
@@ -723,7 +873,7 @@
           <c:order val="0"/>
           <c:tx>
             <c:strRef>
-              <c:f>letters!$A$1</c:f>
+              <c:f>letters!$B$1</c:f>
               <c:strCache>
                 <c:ptCount val="1"/>
                 <c:pt idx="0">
@@ -744,13 +894,97 @@
           <c:marker>
             <c:symbol val="none"/>
           </c:marker>
-          <c:val>
+          <c:cat>
             <c:numRef>
               <c:f>letters!$A$2:$A$26</c:f>
               <c:numCache>
                 <c:formatCode>General</c:formatCode>
                 <c:ptCount val="25"/>
                 <c:pt idx="0">
+                  <c:v>2</c:v>
+                </c:pt>
+                <c:pt idx="1">
+                  <c:v>3</c:v>
+                </c:pt>
+                <c:pt idx="2">
+                  <c:v>4</c:v>
+                </c:pt>
+                <c:pt idx="3">
+                  <c:v>5</c:v>
+                </c:pt>
+                <c:pt idx="4">
+                  <c:v>6</c:v>
+                </c:pt>
+                <c:pt idx="5">
+                  <c:v>7</c:v>
+                </c:pt>
+                <c:pt idx="6">
+                  <c:v>8</c:v>
+                </c:pt>
+                <c:pt idx="7">
+                  <c:v>9</c:v>
+                </c:pt>
+                <c:pt idx="8">
+                  <c:v>10</c:v>
+                </c:pt>
+                <c:pt idx="9">
+                  <c:v>11</c:v>
+                </c:pt>
+                <c:pt idx="10">
+                  <c:v>12</c:v>
+                </c:pt>
+                <c:pt idx="11">
+                  <c:v>13</c:v>
+                </c:pt>
+                <c:pt idx="12">
+                  <c:v>14</c:v>
+                </c:pt>
+                <c:pt idx="13">
+                  <c:v>15</c:v>
+                </c:pt>
+                <c:pt idx="14">
+                  <c:v>16</c:v>
+                </c:pt>
+                <c:pt idx="15">
+                  <c:v>17</c:v>
+                </c:pt>
+                <c:pt idx="16">
+                  <c:v>18</c:v>
+                </c:pt>
+                <c:pt idx="17">
+                  <c:v>19</c:v>
+                </c:pt>
+                <c:pt idx="18">
+                  <c:v>20</c:v>
+                </c:pt>
+                <c:pt idx="19">
+                  <c:v>21</c:v>
+                </c:pt>
+                <c:pt idx="20">
+                  <c:v>22</c:v>
+                </c:pt>
+                <c:pt idx="21">
+                  <c:v>23</c:v>
+                </c:pt>
+                <c:pt idx="22">
+                  <c:v>24</c:v>
+                </c:pt>
+                <c:pt idx="23">
+                  <c:v>25</c:v>
+                </c:pt>
+                <c:pt idx="24">
+                  <c:v>26</c:v>
+                </c:pt>
+              </c:numCache>
+            </c:numRef>
+          </c:cat>
+          <c:val>
+            <c:numRef>
+              <c:f>letters!$B$2:$B$26</c:f>
+              <c:numCache>
+                <c:formatCode>General</c:formatCode>
+                <c:ptCount val="25"/>
+                <c:pt idx="0">
                   <c:v>0.73077000000000003</c:v>
                 </c:pt>
                 <c:pt idx="1">
@@ -831,7 +1065,7 @@
           <c:smooth val="0"/>
           <c:extLst>
             <c:ext xmlns:c16="http://schemas.microsoft.com/office/drawing/2014/chart" uri="{C3380CC4-5D6E-409C-BE32-E72D297353CC}">
-              <c16:uniqueId val="{00000000-4488-4BFC-9D13-C79CEA251474}"/>
+              <c16:uniqueId val="{00000000-CABA-49DB-828A-E103256C28AB}"/>
             </c:ext>
           </c:extLst>
         </c:ser>
@@ -840,7 +1074,7 @@
           <c:order val="1"/>
           <c:tx>
             <c:strRef>
-              <c:f>letters!$B$1</c:f>
+              <c:f>letters!$C$1</c:f>
               <c:strCache>
                 <c:ptCount val="1"/>
                 <c:pt idx="0">
@@ -861,9 +1095,93 @@
           <c:marker>
             <c:symbol val="none"/>
           </c:marker>
+          <c:cat>
+            <c:numRef>
+              <c:f>letters!$A$2:$A$26</c:f>
+              <c:numCache>
+                <c:formatCode>General</c:formatCode>
+                <c:ptCount val="25"/>
+                <c:pt idx="0">
+                  <c:v>2</c:v>
+                </c:pt>
+                <c:pt idx="1">
+                  <c:v>3</c:v>
+                </c:pt>
+                <c:pt idx="2">
+                  <c:v>4</c:v>
+                </c:pt>
+                <c:pt idx="3">
+                  <c:v>5</c:v>
+                </c:pt>
+                <c:pt idx="4">
+                  <c:v>6</c:v>
+                </c:pt>
+                <c:pt idx="5">
+                  <c:v>7</c:v>
+                </c:pt>
+                <c:pt idx="6">
+                  <c:v>8</c:v>
+                </c:pt>
+                <c:pt idx="7">
+                  <c:v>9</c:v>
+                </c:pt>
+                <c:pt idx="8">
+                  <c:v>10</c:v>
+                </c:pt>
+                <c:pt idx="9">
+                  <c:v>11</c:v>
+                </c:pt>
+                <c:pt idx="10">
+                  <c:v>12</c:v>
+                </c:pt>
+                <c:pt idx="11">
+                  <c:v>13</c:v>
+                </c:pt>
+                <c:pt idx="12">
+                  <c:v>14</c:v>
+                </c:pt>
+                <c:pt idx="13">
+                  <c:v>15</c:v>
+                </c:pt>
+                <c:pt idx="14">
+                  <c:v>16</c:v>
+                </c:pt>
+                <c:pt idx="15">
+                  <c:v>17</c:v>
+                </c:pt>
+                <c:pt idx="16">
+                  <c:v>18</c:v>
+                </c:pt>
+                <c:pt idx="17">
+                  <c:v>19</c:v>
+                </c:pt>
+                <c:pt idx="18">
+                  <c:v>20</c:v>
+                </c:pt>
+                <c:pt idx="19">
+                  <c:v>21</c:v>
+                </c:pt>
+                <c:pt idx="20">
+                  <c:v>22</c:v>
+                </c:pt>
+                <c:pt idx="21">
+                  <c:v>23</c:v>
+                </c:pt>
+                <c:pt idx="22">
+                  <c:v>24</c:v>
+                </c:pt>
+                <c:pt idx="23">
+                  <c:v>25</c:v>
+                </c:pt>
+                <c:pt idx="24">
+                  <c:v>26</c:v>
+                </c:pt>
+              </c:numCache>
+            </c:numRef>
+          </c:cat>
           <c:val>
             <c:numRef>
-              <c:f>letters!$B$2:$B$26</c:f>
+              <c:f>letters!$C$2:$C$26</c:f>
               <c:numCache>
                 <c:formatCode>General</c:formatCode>
                 <c:ptCount val="25"/>
@@ -948,7 +1266,7 @@
           <c:smooth val="0"/>
           <c:extLst>
             <c:ext xmlns:c16="http://schemas.microsoft.com/office/drawing/2014/chart" uri="{C3380CC4-5D6E-409C-BE32-E72D297353CC}">
-              <c16:uniqueId val="{00000001-4488-4BFC-9D13-C79CEA251474}"/>
+              <c16:uniqueId val="{00000001-CABA-49DB-828A-E103256C28AB}"/>
             </c:ext>
           </c:extLst>
         </c:ser>
@@ -957,7 +1275,7 @@
           <c:order val="2"/>
           <c:tx>
             <c:strRef>
-              <c:f>letters!$C$1</c:f>
+              <c:f>letters!$D$1</c:f>
               <c:strCache>
                 <c:ptCount val="1"/>
                 <c:pt idx="0">
@@ -978,9 +1296,93 @@
           <c:marker>
             <c:symbol val="none"/>
           </c:marker>
+          <c:cat>
+            <c:numRef>
+              <c:f>letters!$A$2:$A$26</c:f>
+              <c:numCache>
+                <c:formatCode>General</c:formatCode>
+                <c:ptCount val="25"/>
+                <c:pt idx="0">
+                  <c:v>2</c:v>
+                </c:pt>
+                <c:pt idx="1">
+                  <c:v>3</c:v>
+                </c:pt>
+                <c:pt idx="2">
+                  <c:v>4</c:v>
+                </c:pt>
+                <c:pt idx="3">
+                  <c:v>5</c:v>
+                </c:pt>
+                <c:pt idx="4">
+                  <c:v>6</c:v>
+                </c:pt>
+                <c:pt idx="5">
+                  <c:v>7</c:v>
+                </c:pt>
+                <c:pt idx="6">
+                  <c:v>8</c:v>
+                </c:pt>
+                <c:pt idx="7">
+                  <c:v>9</c:v>
+                </c:pt>
+                <c:pt idx="8">
+                  <c:v>10</c:v>
+                </c:pt>
+                <c:pt idx="9">
+                  <c:v>11</c:v>
+                </c:pt>
+                <c:pt idx="10">
+                  <c:v>12</c:v>
+                </c:pt>
+                <c:pt idx="11">
+                  <c:v>13</c:v>
+                </c:pt>
+                <c:pt idx="12">
+                  <c:v>14</c:v>
+                </c:pt>
+                <c:pt idx="13">
+                  <c:v>15</c:v>
+                </c:pt>
+                <c:pt idx="14">
+                  <c:v>16</c:v>
+                </c:pt>
+                <c:pt idx="15">
+                  <c:v>17</c:v>
+                </c:pt>
+                <c:pt idx="16">
+                  <c:v>18</c:v>
+                </c:pt>
+                <c:pt idx="17">
+                  <c:v>19</c:v>
+                </c:pt>
+                <c:pt idx="18">
+                  <c:v>20</c:v>
+                </c:pt>
+                <c:pt idx="19">
+                  <c:v>21</c:v>
+                </c:pt>
+                <c:pt idx="20">
+                  <c:v>22</c:v>
+                </c:pt>
+                <c:pt idx="21">
+                  <c:v>23</c:v>
+                </c:pt>
+                <c:pt idx="22">
+                  <c:v>24</c:v>
+                </c:pt>
+                <c:pt idx="23">
+                  <c:v>25</c:v>
+                </c:pt>
+                <c:pt idx="24">
+                  <c:v>26</c:v>
+                </c:pt>
+              </c:numCache>
+            </c:numRef>
+          </c:cat>
           <c:val>
             <c:numRef>
-              <c:f>letters!$C$2:$C$26</c:f>
+              <c:f>letters!$D$2:$D$26</c:f>
               <c:numCache>
                 <c:formatCode>General</c:formatCode>
                 <c:ptCount val="25"/>
@@ -1065,7 +1467,7 @@
           <c:smooth val="0"/>
           <c:extLst>
             <c:ext xmlns:c16="http://schemas.microsoft.com/office/drawing/2014/chart" uri="{C3380CC4-5D6E-409C-BE32-E72D297353CC}">
-              <c16:uniqueId val="{00000002-4488-4BFC-9D13-C79CEA251474}"/>
+              <c16:uniqueId val="{00000002-CABA-49DB-828A-E103256C28AB}"/>
             </c:ext>
           </c:extLst>
         </c:ser>
@@ -1074,7 +1476,7 @@
           <c:order val="3"/>
           <c:tx>
             <c:strRef>
-              <c:f>letters!$D$1</c:f>
+              <c:f>letters!$E$1</c:f>
               <c:strCache>
                 <c:ptCount val="1"/>
                 <c:pt idx="0">
@@ -1095,9 +1497,93 @@
           <c:marker>
             <c:symbol val="none"/>
           </c:marker>
+          <c:cat>
+            <c:numRef>
+              <c:f>letters!$A$2:$A$26</c:f>
+              <c:numCache>
+                <c:formatCode>General</c:formatCode>
+                <c:ptCount val="25"/>
+                <c:pt idx="0">
+                  <c:v>2</c:v>
+                </c:pt>
+                <c:pt idx="1">
+                  <c:v>3</c:v>
+                </c:pt>
+                <c:pt idx="2">
+                  <c:v>4</c:v>
+                </c:pt>
+                <c:pt idx="3">
+                  <c:v>5</c:v>
+                </c:pt>
+                <c:pt idx="4">
+                  <c:v>6</c:v>
+                </c:pt>
+                <c:pt idx="5">
+                  <c:v>7</c:v>
+                </c:pt>
+                <c:pt idx="6">
+                  <c:v>8</c:v>
+                </c:pt>
+                <c:pt idx="7">
+                  <c:v>9</c:v>
+                </c:pt>
+                <c:pt idx="8">
+                  <c:v>10</c:v>
+                </c:pt>
+                <c:pt idx="9">
+                  <c:v>11</c:v>
+                </c:pt>
+                <c:pt idx="10">
+                  <c:v>12</c:v>
+                </c:pt>
+                <c:pt idx="11">
+                  <c:v>13</c:v>
+                </c:pt>
+                <c:pt idx="12">
+                  <c:v>14</c:v>
+                </c:pt>
+                <c:pt idx="13">
+                  <c:v>15</c:v>
+                </c:pt>
+                <c:pt idx="14">
+                  <c:v>16</c:v>
+                </c:pt>
+                <c:pt idx="15">
+                  <c:v>17</c:v>
+                </c:pt>
+                <c:pt idx="16">
+                  <c:v>18</c:v>
+                </c:pt>
+                <c:pt idx="17">
+                  <c:v>19</c:v>
+                </c:pt>
+                <c:pt idx="18">
+                  <c:v>20</c:v>
+                </c:pt>
+                <c:pt idx="19">
+                  <c:v>21</c:v>
+                </c:pt>
+                <c:pt idx="20">
+                  <c:v>22</c:v>
+                </c:pt>
+                <c:pt idx="21">
+                  <c:v>23</c:v>
+                </c:pt>
+                <c:pt idx="22">
+                  <c:v>24</c:v>
+                </c:pt>
+                <c:pt idx="23">
+                  <c:v>25</c:v>
+                </c:pt>
+                <c:pt idx="24">
+                  <c:v>26</c:v>
+                </c:pt>
+              </c:numCache>
+            </c:numRef>
+          </c:cat>
           <c:val>
             <c:numRef>
-              <c:f>letters!$D$2:$D$26</c:f>
+              <c:f>letters!$E$2:$E$26</c:f>
               <c:numCache>
                 <c:formatCode>General</c:formatCode>
                 <c:ptCount val="25"/>
@@ -1182,7 +1668,7 @@
           <c:smooth val="0"/>
           <c:extLst>
             <c:ext xmlns:c16="http://schemas.microsoft.com/office/drawing/2014/chart" uri="{C3380CC4-5D6E-409C-BE32-E72D297353CC}">
-              <c16:uniqueId val="{00000003-4488-4BFC-9D13-C79CEA251474}"/>
+              <c16:uniqueId val="{00000003-CABA-49DB-828A-E103256C28AB}"/>
             </c:ext>
           </c:extLst>
         </c:ser>
@@ -1195,11 +1681,11 @@
           <c:showBubbleSize val="0"/>
         </c:dLbls>
         <c:smooth val="0"/>
-        <c:axId val="422518720"/>
-        <c:axId val="422519048"/>
+        <c:axId val="379157920"/>
+        <c:axId val="379157592"/>
       </c:lineChart>
       <c:catAx>
-        <c:axId val="422518720"/>
+        <c:axId val="379157920"/>
         <c:scaling>
           <c:orientation val="minMax"/>
         </c:scaling>
@@ -1242,7 +1728,7 @@
             <a:endParaRPr lang="en-US"/>
           </a:p>
         </c:txPr>
-        <c:crossAx val="422519048"/>
+        <c:crossAx val="379157592"/>
         <c:crosses val="autoZero"/>
         <c:auto val="1"/>
         <c:lblAlgn val="ctr"/>
@@ -1250,7 +1736,7 @@
         <c:noMultiLvlLbl val="0"/>
       </c:catAx>
       <c:valAx>
-        <c:axId val="422519048"/>
+        <c:axId val="379157592"/>
         <c:scaling>
           <c:orientation val="minMax"/>
         </c:scaling>
@@ -1301,7 +1787,7 @@
             <a:endParaRPr lang="en-US"/>
           </a:p>
         </c:txPr>
-        <c:crossAx val="422518720"/>
+        <c:crossAx val="379157920"/>
         <c:crosses val="autoZero"/>
         <c:crossBetween val="between"/>
       </c:valAx>
@@ -2528,7 +3014,6 @@
               <a:rPr lang="en-US"/>
               <a:t>Click to edit Master title style</a:t>
             </a:r>
-            <a:endParaRPr lang="en-US"/>
           </a:p>
         </p:txBody>
       </p:sp>
@@ -2593,7 +3078,6 @@
               <a:rPr lang="en-US"/>
               <a:t>Click to edit Master subtitle style</a:t>
             </a:r>
-            <a:endParaRPr lang="en-US"/>
           </a:p>
         </p:txBody>
       </p:sp>
@@ -2711,7 +3195,6 @@
               <a:rPr lang="en-US"/>
               <a:t>Click to edit Master title style</a:t>
             </a:r>
-            <a:endParaRPr lang="en-US"/>
           </a:p>
         </p:txBody>
       </p:sp>
@@ -2763,7 +3246,6 @@
               <a:rPr lang="en-US"/>
               <a:t>Fifth level</a:t>
             </a:r>
-            <a:endParaRPr lang="en-US"/>
           </a:p>
         </p:txBody>
       </p:sp>
@@ -2886,7 +3368,6 @@
               <a:rPr lang="en-US"/>
               <a:t>Click to edit Master title style</a:t>
             </a:r>
-            <a:endParaRPr lang="en-US"/>
           </a:p>
         </p:txBody>
       </p:sp>
@@ -2943,7 +3424,6 @@
               <a:rPr lang="en-US"/>
               <a:t>Fifth level</a:t>
             </a:r>
-            <a:endParaRPr lang="en-US"/>
           </a:p>
         </p:txBody>
       </p:sp>
@@ -3061,7 +3541,6 @@
               <a:rPr lang="en-US"/>
               <a:t>Click to edit Master title style</a:t>
             </a:r>
-            <a:endParaRPr lang="en-US"/>
           </a:p>
         </p:txBody>
       </p:sp>
@@ -3113,7 +3592,6 @@
               <a:rPr lang="en-US"/>
               <a:t>Fifth level</a:t>
             </a:r>
-            <a:endParaRPr lang="en-US"/>
           </a:p>
         </p:txBody>
       </p:sp>
@@ -3240,7 +3718,6 @@
               <a:rPr lang="en-US"/>
               <a:t>Click to edit Master title style</a:t>
             </a:r>
-            <a:endParaRPr lang="en-US"/>
           </a:p>
         </p:txBody>
       </p:sp>
@@ -3477,7 +3954,6 @@
               <a:rPr lang="en-US"/>
               <a:t>Click to edit Master title style</a:t>
             </a:r>
-            <a:endParaRPr lang="en-US"/>
           </a:p>
         </p:txBody>
       </p:sp>
@@ -3534,7 +4010,6 @@
               <a:rPr lang="en-US"/>
               <a:t>Fifth level</a:t>
             </a:r>
-            <a:endParaRPr lang="en-US"/>
           </a:p>
         </p:txBody>
       </p:sp>
@@ -3591,7 +4066,6 @@
               <a:rPr lang="en-US"/>
               <a:t>Fifth level</a:t>
             </a:r>
-            <a:endParaRPr lang="en-US"/>
           </a:p>
         </p:txBody>
       </p:sp>
@@ -3714,7 +4188,6 @@
               <a:rPr lang="en-US"/>
               <a:t>Click to edit Master title style</a:t>
             </a:r>
-            <a:endParaRPr lang="en-US"/>
           </a:p>
         </p:txBody>
       </p:sp>
@@ -3836,7 +4309,6 @@
               <a:rPr lang="en-US"/>
               <a:t>Fifth level</a:t>
             </a:r>
-            <a:endParaRPr lang="en-US"/>
           </a:p>
         </p:txBody>
       </p:sp>
@@ -3958,7 +4430,6 @@
               <a:rPr lang="en-US"/>
               <a:t>Fifth level</a:t>
             </a:r>
-            <a:endParaRPr lang="en-US"/>
           </a:p>
         </p:txBody>
       </p:sp>
@@ -4076,7 +4547,6 @@
               <a:rPr lang="en-US"/>
               <a:t>Click to edit Master title style</a:t>
             </a:r>
-            <a:endParaRPr lang="en-US"/>
           </a:p>
         </p:txBody>
       </p:sp>
@@ -4298,7 +4768,6 @@
               <a:rPr lang="en-US"/>
               <a:t>Click to edit Master title style</a:t>
             </a:r>
-            <a:endParaRPr lang="en-US"/>
           </a:p>
         </p:txBody>
       </p:sp>
@@ -4383,7 +4852,6 @@
               <a:rPr lang="en-US"/>
               <a:t>Fifth level</a:t>
             </a:r>
-            <a:endParaRPr lang="en-US"/>
           </a:p>
         </p:txBody>
       </p:sp>
@@ -4575,7 +5043,6 @@
               <a:rPr lang="en-US"/>
               <a:t>Click to edit Master title style</a:t>
             </a:r>
-            <a:endParaRPr lang="en-US"/>
           </a:p>
         </p:txBody>
       </p:sp>
@@ -4834,7 +5301,6 @@
               <a:rPr lang="en-US"/>
               <a:t>Click to edit Master title style</a:t>
             </a:r>
-            <a:endParaRPr lang="en-US"/>
           </a:p>
         </p:txBody>
       </p:sp>
@@ -4896,7 +5362,6 @@
               <a:rPr lang="en-US"/>
               <a:t>Fifth level</a:t>
             </a:r>
-            <a:endParaRPr lang="en-US"/>
           </a:p>
         </p:txBody>
       </p:sp>
@@ -5342,21 +5807,21 @@
       </p:grpSpPr>
       <p:graphicFrame>
         <p:nvGraphicFramePr>
-          <p:cNvPr id="4" name="Chart 3"/>
+          <p:cNvPr id="6" name="Chart 5"/>
           <p:cNvGraphicFramePr>
             <a:graphicFrameLocks/>
           </p:cNvGraphicFramePr>
           <p:nvPr>
             <p:extLst>
               <p:ext uri="{D42A27DB-BD31-4B8C-83A1-F6EECF244321}">
-                <p14:modId xmlns:p14="http://schemas.microsoft.com/office/powerpoint/2010/main" val="2864597397"/>
+                <p14:modId xmlns:p14="http://schemas.microsoft.com/office/powerpoint/2010/main" val="3607358465"/>
               </p:ext>
             </p:extLst>
           </p:nvPr>
         </p:nvGraphicFramePr>
         <p:xfrm>
-          <a:off x="1063869" y="246185"/>
-          <a:ext cx="5363307" cy="3279529"/>
+          <a:off x="217170" y="308610"/>
+          <a:ext cx="11704320" cy="6355080"/>
         </p:xfrm>
         <a:graphic>
           <a:graphicData uri="http://schemas.openxmlformats.org/drawingml/2006/chart">
@@ -5364,6 +5829,36 @@
           </a:graphicData>
         </a:graphic>
       </p:graphicFrame>
+    </p:spTree>
+    <p:extLst>
+      <p:ext uri="{BB962C8B-B14F-4D97-AF65-F5344CB8AC3E}">
+        <p14:creationId xmlns:p14="http://schemas.microsoft.com/office/powerpoint/2010/main" val="2249266135"/>
+      </p:ext>
+    </p:extLst>
+  </p:cSld>
+  <p:clrMapOvr>
+    <a:masterClrMapping/>
+  </p:clrMapOvr>
+</p:sld>
+</file>
+
+<file path=ppt/slides/slide2.xml><?xml version="1.0" encoding="utf-8"?>
+<p:sld xmlns:a="http://schemas.openxmlformats.org/drawingml/2006/main" xmlns:r="http://schemas.openxmlformats.org/officeDocument/2006/relationships" xmlns:p="http://schemas.openxmlformats.org/presentationml/2006/main">
+  <p:cSld>
+    <p:spTree>
+      <p:nvGrpSpPr>
+        <p:cNvPr id="1" name=""/>
+        <p:cNvGrpSpPr/>
+        <p:nvPr/>
+      </p:nvGrpSpPr>
+      <p:grpSpPr>
+        <a:xfrm>
+          <a:off x="0" y="0"/>
+          <a:ext cx="0" cy="0"/>
+          <a:chOff x="0" y="0"/>
+          <a:chExt cx="0" cy="0"/>
+        </a:xfrm>
+      </p:grpSpPr>
       <p:graphicFrame>
         <p:nvGraphicFramePr>
           <p:cNvPr id="5" name="Chart 4"/>
@@ -5373,25 +5868,25 @@
           <p:nvPr>
             <p:extLst>
               <p:ext uri="{D42A27DB-BD31-4B8C-83A1-F6EECF244321}">
-                <p14:modId xmlns:p14="http://schemas.microsoft.com/office/powerpoint/2010/main" val="2749498352"/>
+                <p14:modId xmlns:p14="http://schemas.microsoft.com/office/powerpoint/2010/main" val="2414847872"/>
               </p:ext>
             </p:extLst>
           </p:nvPr>
         </p:nvGraphicFramePr>
         <p:xfrm>
-          <a:off x="6427176" y="342900"/>
-          <a:ext cx="5067300" cy="3286125"/>
+          <a:off x="102870" y="137160"/>
+          <a:ext cx="11830050" cy="6503670"/>
         </p:xfrm>
         <a:graphic>
           <a:graphicData uri="http://schemas.openxmlformats.org/drawingml/2006/chart">
-            <c:chart xmlns:c="http://schemas.openxmlformats.org/drawingml/2006/chart" xmlns:r="http://schemas.openxmlformats.org/officeDocument/2006/relationships" r:id="rId3"/>
+            <c:chart xmlns:c="http://schemas.openxmlformats.org/drawingml/2006/chart" xmlns:r="http://schemas.openxmlformats.org/officeDocument/2006/relationships" r:id="rId2"/>
           </a:graphicData>
         </a:graphic>
       </p:graphicFrame>
     </p:spTree>
     <p:extLst>
       <p:ext uri="{BB962C8B-B14F-4D97-AF65-F5344CB8AC3E}">
-        <p14:creationId xmlns:p14="http://schemas.microsoft.com/office/powerpoint/2010/main" val="2249266135"/>
+        <p14:creationId xmlns:p14="http://schemas.microsoft.com/office/powerpoint/2010/main" val="3341570145"/>
       </p:ext>
     </p:extLst>
   </p:cSld>

</xml_diff>